<commit_message>
mistakes in pptx resolved
</commit_message>
<xml_diff>
--- a/4. Records/_4. Records.pptx
+++ b/4. Records/_4. Records.pptx
@@ -4416,7 +4416,15 @@
             </a:pPr>
             <a:r>
               <a:rPr lang="ru-RU" sz="1800" dirty="0"/>
-              <a:t>2) Создать процедуру, которая возвращает случайный треугольник, без повтора номера. Данная процедура не должна принимать входных аргументов.</a:t>
+              <a:t>2) Создать функцию, которая возвращает случайный треугольник, без повтора номера. </a:t>
+            </a:r>
+            <a:r>
+              <a:rPr lang="ru-RU" sz="1800"/>
+              <a:t>Данная функция </a:t>
+            </a:r>
+            <a:r>
+              <a:rPr lang="ru-RU" sz="1800" dirty="0"/>
+              <a:t>не должна принимать входных аргументов.</a:t>
             </a:r>
           </a:p>
           <a:p>

</xml_diff>